<commit_message>
text edits, adding reference slide
</commit_message>
<xml_diff>
--- a/presentations/tree_models/Tree_models.pptx
+++ b/presentations/tree_models/Tree_models.pptx
@@ -5,7 +5,7 @@
     <p:sldMasterId id="2147483684" r:id="rId1"/>
   </p:sldMasterIdLst>
   <p:notesMasterIdLst>
-    <p:notesMasterId r:id="rId27"/>
+    <p:notesMasterId r:id="rId28"/>
   </p:notesMasterIdLst>
   <p:sldIdLst>
     <p:sldId id="256" r:id="rId2"/>
@@ -33,6 +33,7 @@
     <p:sldId id="302" r:id="rId24"/>
     <p:sldId id="300" r:id="rId25"/>
     <p:sldId id="292" r:id="rId26"/>
+    <p:sldId id="315" r:id="rId27"/>
   </p:sldIdLst>
   <p:sldSz cx="9144000" cy="6858000" type="screen4x3"/>
   <p:notesSz cx="6858000" cy="9144000"/>
@@ -232,7 +233,7 @@
           <a:p>
             <a:fld id="{2793983C-EFA1-41D2-8DCF-4CEF34100D6A}" type="datetimeFigureOut">
               <a:rPr lang="en-US" smtClean="0"/>
-              <a:t>1/21/2016</a:t>
+              <a:t>1/27/2016</a:t>
             </a:fld>
             <a:endParaRPr lang="en-US"/>
           </a:p>
@@ -1057,34 +1058,22 @@
           <a:bodyPr/>
           <a:lstStyle/>
           <a:p>
-            <a:pPr marL="0" marR="0" indent="0" algn="l" defTabSz="914400" rtl="0" eaLnBrk="1" fontAlgn="auto" latinLnBrk="0" hangingPunct="1">
-              <a:lnSpc>
-                <a:spcPct val="100000"/>
-              </a:lnSpc>
-              <a:spcBef>
-                <a:spcPts val="0"/>
-              </a:spcBef>
-              <a:spcAft>
-                <a:spcPts val="0"/>
-              </a:spcAft>
-              <a:buClrTx/>
-              <a:buSzTx/>
-              <a:buFontTx/>
-              <a:buNone/>
-              <a:tabLst/>
-              <a:defRPr/>
-            </a:pPr>
             <a:r>
               <a:rPr lang="en-US" dirty="0" smtClean="0"/>
-              <a:t>Producer’s accuracy = 100 – omission error = how often are real features</a:t>
+              <a:t>Does not produce a single tree output like </a:t>
+            </a:r>
+            <a:r>
+              <a:rPr lang="en-US" dirty="0" err="1" smtClean="0"/>
+              <a:t>rpart</a:t>
+            </a:r>
+            <a:r>
+              <a:rPr lang="en-US" dirty="0" smtClean="0"/>
+              <a:t> because decisions are not made on</a:t>
             </a:r>
             <a:r>
               <a:rPr lang="en-US" baseline="0" dirty="0" smtClean="0"/>
-              <a:t> in the field correctly shown on the map?</a:t>
-            </a:r>
-            <a:endParaRPr lang="en-US" dirty="0" smtClean="0"/>
-          </a:p>
-          <a:p>
+              <a:t> a single binary tree….decisions are made using an ensemble of trees. </a:t>
+            </a:r>
             <a:endParaRPr lang="en-US" dirty="0"/>
           </a:p>
         </p:txBody>
@@ -1106,7 +1095,7 @@
           <a:p>
             <a:fld id="{CC5A1FCD-79C7-4337-B79E-A51417706FB1}" type="slidenum">
               <a:rPr lang="en-US" smtClean="0"/>
-              <a:t>18</a:t>
+              <a:t>12</a:t>
             </a:fld>
             <a:endParaRPr lang="en-US"/>
           </a:p>
@@ -1115,7 +1104,7 @@
     </p:spTree>
     <p:extLst>
       <p:ext uri="{BB962C8B-B14F-4D97-AF65-F5344CB8AC3E}">
-        <p14:creationId xmlns:p14="http://schemas.microsoft.com/office/powerpoint/2010/main" val="3699961861"/>
+        <p14:creationId xmlns:p14="http://schemas.microsoft.com/office/powerpoint/2010/main" val="1426688702"/>
       </p:ext>
     </p:extLst>
   </p:cSld>
@@ -1169,6 +1158,118 @@
           <a:bodyPr/>
           <a:lstStyle/>
           <a:p>
+            <a:pPr marL="0" marR="0" indent="0" algn="l" defTabSz="914400" rtl="0" eaLnBrk="1" fontAlgn="auto" latinLnBrk="0" hangingPunct="1">
+              <a:lnSpc>
+                <a:spcPct val="100000"/>
+              </a:lnSpc>
+              <a:spcBef>
+                <a:spcPts val="0"/>
+              </a:spcBef>
+              <a:spcAft>
+                <a:spcPts val="0"/>
+              </a:spcAft>
+              <a:buClrTx/>
+              <a:buSzTx/>
+              <a:buFontTx/>
+              <a:buNone/>
+              <a:tabLst/>
+              <a:defRPr/>
+            </a:pPr>
+            <a:r>
+              <a:rPr lang="en-US" dirty="0" smtClean="0"/>
+              <a:t>Producer’s accuracy = 100 – omission error = how often are real features</a:t>
+            </a:r>
+            <a:r>
+              <a:rPr lang="en-US" baseline="0" dirty="0" smtClean="0"/>
+              <a:t> in the field correctly shown on the map?</a:t>
+            </a:r>
+            <a:endParaRPr lang="en-US" dirty="0" smtClean="0"/>
+          </a:p>
+          <a:p>
+            <a:endParaRPr lang="en-US" dirty="0"/>
+          </a:p>
+        </p:txBody>
+      </p:sp>
+      <p:sp>
+        <p:nvSpPr>
+          <p:cNvPr id="4" name="Slide Number Placeholder 3"/>
+          <p:cNvSpPr>
+            <a:spLocks noGrp="1"/>
+          </p:cNvSpPr>
+          <p:nvPr>
+            <p:ph type="sldNum" sz="quarter" idx="10"/>
+          </p:nvPr>
+        </p:nvSpPr>
+        <p:spPr/>
+        <p:txBody>
+          <a:bodyPr/>
+          <a:lstStyle/>
+          <a:p>
+            <a:fld id="{CC5A1FCD-79C7-4337-B79E-A51417706FB1}" type="slidenum">
+              <a:rPr lang="en-US" smtClean="0"/>
+              <a:t>18</a:t>
+            </a:fld>
+            <a:endParaRPr lang="en-US"/>
+          </a:p>
+        </p:txBody>
+      </p:sp>
+    </p:spTree>
+    <p:extLst>
+      <p:ext uri="{BB962C8B-B14F-4D97-AF65-F5344CB8AC3E}">
+        <p14:creationId xmlns:p14="http://schemas.microsoft.com/office/powerpoint/2010/main" val="3699961861"/>
+      </p:ext>
+    </p:extLst>
+  </p:cSld>
+  <p:clrMapOvr>
+    <a:masterClrMapping/>
+  </p:clrMapOvr>
+</p:notes>
+</file>
+
+<file path=ppt/notesSlides/notesSlide7.xml><?xml version="1.0" encoding="utf-8"?>
+<p:notes xmlns:a="http://schemas.openxmlformats.org/drawingml/2006/main" xmlns:r="http://schemas.openxmlformats.org/officeDocument/2006/relationships" xmlns:p="http://schemas.openxmlformats.org/presentationml/2006/main">
+  <p:cSld>
+    <p:spTree>
+      <p:nvGrpSpPr>
+        <p:cNvPr id="1" name=""/>
+        <p:cNvGrpSpPr/>
+        <p:nvPr/>
+      </p:nvGrpSpPr>
+      <p:grpSpPr>
+        <a:xfrm>
+          <a:off x="0" y="0"/>
+          <a:ext cx="0" cy="0"/>
+          <a:chOff x="0" y="0"/>
+          <a:chExt cx="0" cy="0"/>
+        </a:xfrm>
+      </p:grpSpPr>
+      <p:sp>
+        <p:nvSpPr>
+          <p:cNvPr id="2" name="Slide Image Placeholder 1"/>
+          <p:cNvSpPr>
+            <a:spLocks noGrp="1" noRot="1" noChangeAspect="1"/>
+          </p:cNvSpPr>
+          <p:nvPr>
+            <p:ph type="sldImg"/>
+          </p:nvPr>
+        </p:nvSpPr>
+        <p:spPr/>
+      </p:sp>
+      <p:sp>
+        <p:nvSpPr>
+          <p:cNvPr id="3" name="Notes Placeholder 2"/>
+          <p:cNvSpPr>
+            <a:spLocks noGrp="1"/>
+          </p:cNvSpPr>
+          <p:nvPr>
+            <p:ph type="body" idx="1"/>
+          </p:nvPr>
+        </p:nvSpPr>
+        <p:spPr/>
+        <p:txBody>
+          <a:bodyPr/>
+          <a:lstStyle/>
+          <a:p>
             <a:r>
               <a:rPr lang="en-US" dirty="0" smtClean="0"/>
               <a:t>User’s accuracy = 100 – commission error = how often is the class on the map actually truthful in reality</a:t>
@@ -1213,7 +1314,7 @@
 </p:notes>
 </file>
 
-<file path=ppt/notesSlides/notesSlide7.xml><?xml version="1.0" encoding="utf-8"?>
+<file path=ppt/notesSlides/notesSlide8.xml><?xml version="1.0" encoding="utf-8"?>
 <p:notes xmlns:a="http://schemas.openxmlformats.org/drawingml/2006/main" xmlns:r="http://schemas.openxmlformats.org/officeDocument/2006/relationships" xmlns:p="http://schemas.openxmlformats.org/presentationml/2006/main">
   <p:cSld>
     <p:spTree>
@@ -1512,7 +1613,7 @@
           <a:p>
             <a:fld id="{97CFF939-70E9-4E47-9899-4E3DA2789027}" type="datetimeFigureOut">
               <a:rPr lang="en-US" smtClean="0"/>
-              <a:t>1/21/2016</a:t>
+              <a:t>1/27/2016</a:t>
             </a:fld>
             <a:endParaRPr lang="en-US"/>
           </a:p>
@@ -1704,7 +1805,7 @@
           <a:p>
             <a:fld id="{97CFF939-70E9-4E47-9899-4E3DA2789027}" type="datetimeFigureOut">
               <a:rPr lang="en-US" smtClean="0"/>
-              <a:t>1/21/2016</a:t>
+              <a:t>1/27/2016</a:t>
             </a:fld>
             <a:endParaRPr lang="en-US"/>
           </a:p>
@@ -1884,7 +1985,7 @@
           <a:p>
             <a:fld id="{97CFF939-70E9-4E47-9899-4E3DA2789027}" type="datetimeFigureOut">
               <a:rPr lang="en-US" smtClean="0"/>
-              <a:t>1/21/2016</a:t>
+              <a:t>1/27/2016</a:t>
             </a:fld>
             <a:endParaRPr lang="en-US"/>
           </a:p>
@@ -2054,7 +2155,7 @@
           <a:p>
             <a:fld id="{97CFF939-70E9-4E47-9899-4E3DA2789027}" type="datetimeFigureOut">
               <a:rPr lang="en-US" smtClean="0"/>
-              <a:t>1/21/2016</a:t>
+              <a:t>1/27/2016</a:t>
             </a:fld>
             <a:endParaRPr lang="en-US"/>
           </a:p>
@@ -2308,7 +2409,7 @@
           <a:p>
             <a:fld id="{97CFF939-70E9-4E47-9899-4E3DA2789027}" type="datetimeFigureOut">
               <a:rPr lang="en-US" smtClean="0"/>
-              <a:t>1/21/2016</a:t>
+              <a:t>1/27/2016</a:t>
             </a:fld>
             <a:endParaRPr lang="en-US"/>
           </a:p>
@@ -2634,7 +2735,7 @@
           <a:p>
             <a:fld id="{97CFF939-70E9-4E47-9899-4E3DA2789027}" type="datetimeFigureOut">
               <a:rPr lang="en-US" smtClean="0"/>
-              <a:t>1/21/2016</a:t>
+              <a:t>1/27/2016</a:t>
             </a:fld>
             <a:endParaRPr lang="en-US"/>
           </a:p>
@@ -3054,7 +3155,7 @@
           <a:p>
             <a:fld id="{97CFF939-70E9-4E47-9899-4E3DA2789027}" type="datetimeFigureOut">
               <a:rPr lang="en-US" smtClean="0"/>
-              <a:t>1/21/2016</a:t>
+              <a:t>1/27/2016</a:t>
             </a:fld>
             <a:endParaRPr lang="en-US"/>
           </a:p>
@@ -3172,7 +3273,7 @@
           <a:p>
             <a:fld id="{97CFF939-70E9-4E47-9899-4E3DA2789027}" type="datetimeFigureOut">
               <a:rPr lang="en-US" smtClean="0"/>
-              <a:t>1/21/2016</a:t>
+              <a:t>1/27/2016</a:t>
             </a:fld>
             <a:endParaRPr lang="en-US"/>
           </a:p>
@@ -3267,7 +3368,7 @@
           <a:p>
             <a:fld id="{97CFF939-70E9-4E47-9899-4E3DA2789027}" type="datetimeFigureOut">
               <a:rPr lang="en-US" smtClean="0"/>
-              <a:t>1/21/2016</a:t>
+              <a:t>1/27/2016</a:t>
             </a:fld>
             <a:endParaRPr lang="en-US"/>
           </a:p>
@@ -3554,7 +3655,7 @@
           <a:p>
             <a:fld id="{97CFF939-70E9-4E47-9899-4E3DA2789027}" type="datetimeFigureOut">
               <a:rPr lang="en-US" smtClean="0"/>
-              <a:t>1/21/2016</a:t>
+              <a:t>1/27/2016</a:t>
             </a:fld>
             <a:endParaRPr lang="en-US"/>
           </a:p>
@@ -3876,7 +3977,7 @@
           <a:p>
             <a:fld id="{97CFF939-70E9-4E47-9899-4E3DA2789027}" type="datetimeFigureOut">
               <a:rPr lang="en-US" smtClean="0"/>
-              <a:t>1/21/2016</a:t>
+              <a:t>1/27/2016</a:t>
             </a:fld>
             <a:endParaRPr lang="en-US"/>
           </a:p>
@@ -4130,7 +4231,7 @@
           <a:p>
             <a:fld id="{97CFF939-70E9-4E47-9899-4E3DA2789027}" type="datetimeFigureOut">
               <a:rPr lang="en-US" smtClean="0"/>
-              <a:t>1/21/2016</a:t>
+              <a:t>1/27/2016</a:t>
             </a:fld>
             <a:endParaRPr lang="en-US"/>
           </a:p>
@@ -9520,8 +9621,8 @@
         </p:nvSpPr>
         <p:spPr>
           <a:xfrm>
-            <a:off x="628650" y="1825624"/>
-            <a:ext cx="7677150" cy="4956176"/>
+            <a:off x="946404" y="1825624"/>
+            <a:ext cx="7130796" cy="4956176"/>
           </a:xfrm>
         </p:spPr>
         <p:txBody>
@@ -9531,87 +9632,87 @@
           <a:lstStyle/>
           <a:p>
             <a:r>
-              <a:rPr lang="en-US" sz="2200" dirty="0"/>
+              <a:rPr lang="en-US" sz="2000" dirty="0"/>
               <a:t>Tree-based models are </a:t>
             </a:r>
             <a:r>
-              <a:rPr lang="en-US" sz="2200" dirty="0" smtClean="0"/>
+              <a:rPr lang="en-US" sz="2000" dirty="0" smtClean="0"/>
               <a:t>quick, intuitive, nonparametric</a:t>
             </a:r>
             <a:r>
-              <a:rPr lang="en-US" sz="2200" dirty="0"/>
+              <a:rPr lang="en-US" sz="2000" dirty="0"/>
               <a:t>, and are often ideal for exploratory data analysis and prediction</a:t>
             </a:r>
-            <a:endParaRPr lang="en-US" sz="2200" dirty="0" smtClean="0"/>
-          </a:p>
-          <a:p>
-            <a:r>
-              <a:rPr lang="en-US" sz="2200" dirty="0" smtClean="0"/>
+            <a:endParaRPr lang="en-US" sz="2000" dirty="0" smtClean="0"/>
+          </a:p>
+          <a:p>
+            <a:r>
+              <a:rPr lang="en-US" sz="2000" dirty="0" smtClean="0"/>
               <a:t>Both </a:t>
             </a:r>
             <a:r>
-              <a:rPr lang="en-US" sz="2200" dirty="0" err="1" smtClean="0"/>
+              <a:rPr lang="en-US" sz="2000" dirty="0" err="1" smtClean="0"/>
               <a:t>rpart</a:t>
             </a:r>
             <a:r>
-              <a:rPr lang="en-US" sz="2200" dirty="0" smtClean="0"/>
+              <a:rPr lang="en-US" sz="2000" dirty="0" smtClean="0"/>
               <a:t> and </a:t>
             </a:r>
             <a:r>
-              <a:rPr lang="en-US" sz="2200" dirty="0" err="1" smtClean="0"/>
+              <a:rPr lang="en-US" sz="2000" dirty="0" err="1" smtClean="0"/>
               <a:t>randomForest</a:t>
             </a:r>
             <a:r>
-              <a:rPr lang="en-US" sz="2200" dirty="0" smtClean="0"/>
+              <a:rPr lang="en-US" sz="2000" dirty="0" smtClean="0"/>
               <a:t> </a:t>
             </a:r>
             <a:r>
-              <a:rPr lang="en-US" sz="2200" dirty="0"/>
+              <a:rPr lang="en-US" sz="2000" dirty="0"/>
               <a:t>packages </a:t>
             </a:r>
             <a:r>
-              <a:rPr lang="en-US" sz="2200" dirty="0" smtClean="0"/>
+              <a:rPr lang="en-US" sz="2000" dirty="0" smtClean="0"/>
               <a:t>perform </a:t>
             </a:r>
             <a:r>
-              <a:rPr lang="en-US" sz="2200" dirty="0"/>
+              <a:rPr lang="en-US" sz="2000" dirty="0"/>
               <a:t>internal </a:t>
             </a:r>
             <a:r>
-              <a:rPr lang="en-US" sz="2200" dirty="0" smtClean="0"/>
+              <a:rPr lang="en-US" sz="2000" dirty="0" smtClean="0"/>
               <a:t>validation </a:t>
             </a:r>
             <a:r>
-              <a:rPr lang="en-US" sz="2200" dirty="0"/>
+              <a:rPr lang="en-US" sz="2000" dirty="0"/>
               <a:t>(</a:t>
             </a:r>
             <a:r>
-              <a:rPr lang="en-US" sz="2200" dirty="0" err="1"/>
+              <a:rPr lang="en-US" sz="2000" dirty="0" err="1"/>
               <a:t>rpart</a:t>
             </a:r>
             <a:r>
-              <a:rPr lang="en-US" sz="2200" dirty="0"/>
+              <a:rPr lang="en-US" sz="2000" dirty="0"/>
               <a:t>=10-fold cross validation; </a:t>
             </a:r>
             <a:r>
-              <a:rPr lang="en-US" sz="2200" dirty="0" err="1"/>
+              <a:rPr lang="en-US" sz="2000" dirty="0" err="1"/>
               <a:t>randomForest</a:t>
             </a:r>
             <a:r>
-              <a:rPr lang="en-US" sz="2200" dirty="0"/>
+              <a:rPr lang="en-US" sz="2000" dirty="0"/>
               <a:t>=OOB error estimates) </a:t>
             </a:r>
-            <a:endParaRPr lang="en-US" sz="2200" dirty="0" smtClean="0"/>
-          </a:p>
-          <a:p>
-            <a:r>
-              <a:rPr lang="en-US" sz="2200" dirty="0"/>
+            <a:endParaRPr lang="en-US" sz="2000" dirty="0" smtClean="0"/>
+          </a:p>
+          <a:p>
+            <a:r>
+              <a:rPr lang="en-US" sz="2000" dirty="0"/>
               <a:t>In general, tree-based models are robust against multicollinearity and low n, high p datasets</a:t>
             </a:r>
           </a:p>
           <a:p>
             <a:r>
-              <a:rPr lang="en-US" sz="2200" dirty="0" smtClean="0"/>
+              <a:rPr lang="en-US" sz="2000" dirty="0" smtClean="0"/>
               <a:t>Caveats</a:t>
             </a:r>
           </a:p>
@@ -9622,11 +9723,11 @@
             </a:pPr>
             <a:r>
               <a:rPr lang="en-US" sz="2000" dirty="0" smtClean="0"/>
-              <a:t>Outliers (model stability and over-fitting)</a:t>
-            </a:r>
-          </a:p>
-          <a:p>
-            <a:pPr lvl="1">
+              <a:t> Outliers (model stability and over-fitting)</a:t>
+            </a:r>
+          </a:p>
+          <a:p>
+            <a:pPr marL="519113" lvl="1" indent="-244475">
               <a:buFont typeface="Courier New" panose="02070309020205020404" pitchFamily="49" charset="0"/>
               <a:buChar char="o"/>
             </a:pPr>
@@ -10182,6 +10283,186 @@
       </p:par>
     </p:tnLst>
   </p:timing>
+</p:sld>
+</file>
+
+<file path=ppt/slides/slide26.xml><?xml version="1.0" encoding="utf-8"?>
+<p:sld xmlns:a="http://schemas.openxmlformats.org/drawingml/2006/main" xmlns:r="http://schemas.openxmlformats.org/officeDocument/2006/relationships" xmlns:p="http://schemas.openxmlformats.org/presentationml/2006/main">
+  <p:cSld>
+    <p:spTree>
+      <p:nvGrpSpPr>
+        <p:cNvPr id="1" name=""/>
+        <p:cNvGrpSpPr/>
+        <p:nvPr/>
+      </p:nvGrpSpPr>
+      <p:grpSpPr>
+        <a:xfrm>
+          <a:off x="0" y="0"/>
+          <a:ext cx="0" cy="0"/>
+          <a:chOff x="0" y="0"/>
+          <a:chExt cx="0" cy="0"/>
+        </a:xfrm>
+      </p:grpSpPr>
+      <p:sp>
+        <p:nvSpPr>
+          <p:cNvPr id="2" name="Title 1"/>
+          <p:cNvSpPr>
+            <a:spLocks noGrp="1"/>
+          </p:cNvSpPr>
+          <p:nvPr>
+            <p:ph type="title"/>
+          </p:nvPr>
+        </p:nvSpPr>
+        <p:spPr/>
+        <p:txBody>
+          <a:bodyPr/>
+          <a:lstStyle/>
+          <a:p>
+            <a:r>
+              <a:rPr lang="en-US" dirty="0" smtClean="0"/>
+              <a:t>References</a:t>
+            </a:r>
+            <a:endParaRPr lang="en-US" dirty="0"/>
+          </a:p>
+        </p:txBody>
+      </p:sp>
+      <p:sp>
+        <p:nvSpPr>
+          <p:cNvPr id="3" name="Content Placeholder 2"/>
+          <p:cNvSpPr>
+            <a:spLocks noGrp="1"/>
+          </p:cNvSpPr>
+          <p:nvPr>
+            <p:ph idx="1"/>
+          </p:nvPr>
+        </p:nvSpPr>
+        <p:spPr/>
+        <p:txBody>
+          <a:bodyPr/>
+          <a:lstStyle/>
+          <a:p>
+            <a:pPr marL="0" indent="0">
+              <a:buNone/>
+            </a:pPr>
+            <a:r>
+              <a:rPr lang="en-US" dirty="0" err="1" smtClean="0"/>
+              <a:t>Brungard</a:t>
+            </a:r>
+            <a:r>
+              <a:rPr lang="en-US" dirty="0" smtClean="0"/>
+              <a:t>, C.W., J.L. </a:t>
+            </a:r>
+            <a:r>
+              <a:rPr lang="en-US" dirty="0" err="1" smtClean="0"/>
+              <a:t>Boettinger</a:t>
+            </a:r>
+            <a:r>
+              <a:rPr lang="en-US" dirty="0" smtClean="0"/>
+              <a:t>, M.C. </a:t>
+            </a:r>
+            <a:r>
+              <a:rPr lang="en-US" dirty="0" err="1" smtClean="0"/>
+              <a:t>Duniway</a:t>
+            </a:r>
+            <a:r>
+              <a:rPr lang="en-US" dirty="0" smtClean="0"/>
+              <a:t>, S.A. Wills, T.C. Edwards Jr. 2015. Machine learning for predicting soil classes in three semi-arid landscapes. </a:t>
+            </a:r>
+            <a:r>
+              <a:rPr lang="en-US" dirty="0" err="1" smtClean="0"/>
+              <a:t>Geoderma</a:t>
+            </a:r>
+            <a:r>
+              <a:rPr lang="en-US" dirty="0" smtClean="0"/>
+              <a:t>. 239-240, 68-83. </a:t>
+            </a:r>
+          </a:p>
+          <a:p>
+            <a:pPr marL="0" indent="0">
+              <a:buNone/>
+            </a:pPr>
+            <a:r>
+              <a:rPr lang="en-US" dirty="0" err="1" smtClean="0"/>
+              <a:t>Nauman</a:t>
+            </a:r>
+            <a:r>
+              <a:rPr lang="en-US" dirty="0" smtClean="0"/>
+              <a:t>, T.W., J.A. Thompson, S. J. Teets, T.A. Dilliplane, J.W. Bell, S.J. Connolly, H.J. Liebermann, K.M. Yoast. 2015. Ghosts of the forest: mapping </a:t>
+            </a:r>
+            <a:r>
+              <a:rPr lang="en-US" dirty="0" err="1" smtClean="0"/>
+              <a:t>pedomemory</a:t>
+            </a:r>
+            <a:r>
+              <a:rPr lang="en-US" dirty="0" smtClean="0"/>
+              <a:t> to guide forest restoration. </a:t>
+            </a:r>
+            <a:r>
+              <a:rPr lang="en-US" dirty="0" err="1" smtClean="0"/>
+              <a:t>Geoderma</a:t>
+            </a:r>
+            <a:r>
+              <a:rPr lang="en-US" dirty="0" smtClean="0"/>
+              <a:t>. 247-248, 51-64.</a:t>
+            </a:r>
+          </a:p>
+          <a:p>
+            <a:pPr marL="0" indent="0">
+              <a:buNone/>
+            </a:pPr>
+            <a:r>
+              <a:rPr lang="en-US" dirty="0" err="1"/>
+              <a:t>Sequeira</a:t>
+            </a:r>
+            <a:r>
+              <a:rPr lang="en-US" dirty="0"/>
+              <a:t>, C.H., S.A. Wills, C.A. Seybold, and L.T. West. 2013. Predicting soil bulk density from incomplete datasets. </a:t>
+            </a:r>
+            <a:r>
+              <a:rPr lang="en-US" dirty="0" err="1"/>
+              <a:t>Geoderma</a:t>
+            </a:r>
+            <a:r>
+              <a:rPr lang="en-US" dirty="0"/>
+              <a:t>. 213: 64-73.</a:t>
+            </a:r>
+          </a:p>
+          <a:p>
+            <a:pPr marL="0" indent="0">
+              <a:buNone/>
+            </a:pPr>
+            <a:endParaRPr lang="en-US" dirty="0"/>
+          </a:p>
+          <a:p>
+            <a:pPr marL="0" indent="0">
+              <a:buNone/>
+            </a:pPr>
+            <a:endParaRPr lang="en-US" dirty="0" smtClean="0"/>
+          </a:p>
+          <a:p>
+            <a:pPr marL="0" indent="0">
+              <a:buNone/>
+            </a:pPr>
+            <a:endParaRPr lang="en-US" dirty="0"/>
+          </a:p>
+          <a:p>
+            <a:pPr marL="0" indent="0">
+              <a:buNone/>
+            </a:pPr>
+            <a:endParaRPr lang="en-US" dirty="0"/>
+          </a:p>
+        </p:txBody>
+      </p:sp>
+    </p:spTree>
+    <p:extLst>
+      <p:ext uri="{BB962C8B-B14F-4D97-AF65-F5344CB8AC3E}">
+        <p14:creationId xmlns:p14="http://schemas.microsoft.com/office/powerpoint/2010/main" val="1710294387"/>
+      </p:ext>
+    </p:extLst>
+  </p:cSld>
+  <p:clrMapOvr>
+    <a:masterClrMapping/>
+  </p:clrMapOvr>
 </p:sld>
 </file>
 

</xml_diff>